<commit_message>
Slides w3 update 3
</commit_message>
<xml_diff>
--- a/course2/ML Data Lifecycle in Production - Week 3 Slides.pptx
+++ b/course2/ML Data Lifecycle in Production - Week 3 Slides.pptx
@@ -19,6 +19,12 @@
     <p:sldId id="269" r:id="rId13"/>
     <p:sldId id="270" r:id="rId14"/>
     <p:sldId id="265" r:id="rId15"/>
+    <p:sldId id="271" r:id="rId16"/>
+    <p:sldId id="272" r:id="rId17"/>
+    <p:sldId id="273" r:id="rId18"/>
+    <p:sldId id="274" r:id="rId19"/>
+    <p:sldId id="275" r:id="rId20"/>
+    <p:sldId id="276" r:id="rId21"/>
   </p:sldIdLst>
   <p:sldSz cx="12192000" cy="6858000"/>
   <p:notesSz cx="6858000" cy="9144000"/>
@@ -117,6 +123,11 @@
       </a:defRPr>
     </a:lvl9pPr>
   </p:defaultTextStyle>
+  <p:extLst>
+    <p:ext uri="{EFAFB233-063F-42B5-8137-9DF3F51BA10A}">
+      <p15:sldGuideLst xmlns:p15="http://schemas.microsoft.com/office/powerpoint/2012/main"/>
+    </p:ext>
+  </p:extLst>
 </p:presentation>
 </file>
 
@@ -269,7 +280,7 @@
           <a:p>
             <a:fld id="{8125938C-67E4-4181-91FC-C04E412A9E6D}" type="datetimeFigureOut">
               <a:rPr lang="hr-HR" smtClean="0"/>
-              <a:t>6.7.2021.</a:t>
+              <a:t>8.7.2021.</a:t>
             </a:fld>
             <a:endParaRPr lang="hr-HR"/>
           </a:p>
@@ -469,7 +480,7 @@
           <a:p>
             <a:fld id="{8125938C-67E4-4181-91FC-C04E412A9E6D}" type="datetimeFigureOut">
               <a:rPr lang="hr-HR" smtClean="0"/>
-              <a:t>6.7.2021.</a:t>
+              <a:t>8.7.2021.</a:t>
             </a:fld>
             <a:endParaRPr lang="hr-HR"/>
           </a:p>
@@ -679,7 +690,7 @@
           <a:p>
             <a:fld id="{8125938C-67E4-4181-91FC-C04E412A9E6D}" type="datetimeFigureOut">
               <a:rPr lang="hr-HR" smtClean="0"/>
-              <a:t>6.7.2021.</a:t>
+              <a:t>8.7.2021.</a:t>
             </a:fld>
             <a:endParaRPr lang="hr-HR"/>
           </a:p>
@@ -879,7 +890,7 @@
           <a:p>
             <a:fld id="{8125938C-67E4-4181-91FC-C04E412A9E6D}" type="datetimeFigureOut">
               <a:rPr lang="hr-HR" smtClean="0"/>
-              <a:t>6.7.2021.</a:t>
+              <a:t>8.7.2021.</a:t>
             </a:fld>
             <a:endParaRPr lang="hr-HR"/>
           </a:p>
@@ -1155,7 +1166,7 @@
           <a:p>
             <a:fld id="{8125938C-67E4-4181-91FC-C04E412A9E6D}" type="datetimeFigureOut">
               <a:rPr lang="hr-HR" smtClean="0"/>
-              <a:t>6.7.2021.</a:t>
+              <a:t>8.7.2021.</a:t>
             </a:fld>
             <a:endParaRPr lang="hr-HR"/>
           </a:p>
@@ -1423,7 +1434,7 @@
           <a:p>
             <a:fld id="{8125938C-67E4-4181-91FC-C04E412A9E6D}" type="datetimeFigureOut">
               <a:rPr lang="hr-HR" smtClean="0"/>
-              <a:t>6.7.2021.</a:t>
+              <a:t>8.7.2021.</a:t>
             </a:fld>
             <a:endParaRPr lang="hr-HR"/>
           </a:p>
@@ -1838,7 +1849,7 @@
           <a:p>
             <a:fld id="{8125938C-67E4-4181-91FC-C04E412A9E6D}" type="datetimeFigureOut">
               <a:rPr lang="hr-HR" smtClean="0"/>
-              <a:t>6.7.2021.</a:t>
+              <a:t>8.7.2021.</a:t>
             </a:fld>
             <a:endParaRPr lang="hr-HR"/>
           </a:p>
@@ -1980,7 +1991,7 @@
           <a:p>
             <a:fld id="{8125938C-67E4-4181-91FC-C04E412A9E6D}" type="datetimeFigureOut">
               <a:rPr lang="hr-HR" smtClean="0"/>
-              <a:t>6.7.2021.</a:t>
+              <a:t>8.7.2021.</a:t>
             </a:fld>
             <a:endParaRPr lang="hr-HR"/>
           </a:p>
@@ -2093,7 +2104,7 @@
           <a:p>
             <a:fld id="{8125938C-67E4-4181-91FC-C04E412A9E6D}" type="datetimeFigureOut">
               <a:rPr lang="hr-HR" smtClean="0"/>
-              <a:t>6.7.2021.</a:t>
+              <a:t>8.7.2021.</a:t>
             </a:fld>
             <a:endParaRPr lang="hr-HR"/>
           </a:p>
@@ -2406,7 +2417,7 @@
           <a:p>
             <a:fld id="{8125938C-67E4-4181-91FC-C04E412A9E6D}" type="datetimeFigureOut">
               <a:rPr lang="hr-HR" smtClean="0"/>
-              <a:t>6.7.2021.</a:t>
+              <a:t>8.7.2021.</a:t>
             </a:fld>
             <a:endParaRPr lang="hr-HR"/>
           </a:p>
@@ -2695,7 +2706,7 @@
           <a:p>
             <a:fld id="{8125938C-67E4-4181-91FC-C04E412A9E6D}" type="datetimeFigureOut">
               <a:rPr lang="hr-HR" smtClean="0"/>
-              <a:t>6.7.2021.</a:t>
+              <a:t>8.7.2021.</a:t>
             </a:fld>
             <a:endParaRPr lang="hr-HR"/>
           </a:p>
@@ -2938,7 +2949,7 @@
           <a:p>
             <a:fld id="{8125938C-67E4-4181-91FC-C04E412A9E6D}" type="datetimeFigureOut">
               <a:rPr lang="hr-HR" smtClean="0"/>
-              <a:t>6.7.2021.</a:t>
+              <a:t>8.7.2021.</a:t>
             </a:fld>
             <a:endParaRPr lang="hr-HR"/>
           </a:p>
@@ -3600,31 +3611,38 @@
           </a:p>
         </p:txBody>
       </p:sp>
-      <p:sp>
-        <p:nvSpPr>
-          <p:cNvPr id="3" name="Content Placeholder 2">
-            <a:extLst>
-              <a:ext uri="{FF2B5EF4-FFF2-40B4-BE49-F238E27FC236}">
-                <a16:creationId xmlns:a16="http://schemas.microsoft.com/office/drawing/2014/main" id="{39CC6BAA-292D-485F-BE47-4CC7A7670C3A}"/>
-              </a:ext>
-            </a:extLst>
-          </p:cNvPr>
-          <p:cNvSpPr>
-            <a:spLocks noGrp="1"/>
-          </p:cNvSpPr>
+      <p:pic>
+        <p:nvPicPr>
+          <p:cNvPr id="4" name="Content Placeholder 3">
+            <a:extLst>
+              <a:ext uri="{FF2B5EF4-FFF2-40B4-BE49-F238E27FC236}">
+                <a16:creationId xmlns:a16="http://schemas.microsoft.com/office/drawing/2014/main" id="{319571A7-AF48-41B1-BD23-42F667FABA80}"/>
+              </a:ext>
+            </a:extLst>
+          </p:cNvPr>
+          <p:cNvPicPr>
+            <a:picLocks noGrp="1" noChangeAspect="1"/>
+          </p:cNvPicPr>
           <p:nvPr>
             <p:ph idx="1"/>
           </p:nvPr>
-        </p:nvSpPr>
-        <p:spPr/>
-        <p:txBody>
-          <a:bodyPr/>
-          <a:lstStyle/>
-          <a:p>
-            <a:endParaRPr lang="hr-HR"/>
-          </a:p>
-        </p:txBody>
-      </p:sp>
+        </p:nvPicPr>
+        <p:blipFill>
+          <a:blip r:embed="rId2"/>
+          <a:stretch>
+            <a:fillRect/>
+          </a:stretch>
+        </p:blipFill>
+        <p:spPr>
+          <a:xfrm>
+            <a:off x="0" y="-1"/>
+            <a:ext cx="12192000" cy="6859837"/>
+          </a:xfrm>
+          <a:prstGeom prst="rect">
+            <a:avLst/>
+          </a:prstGeom>
+        </p:spPr>
+      </p:pic>
     </p:spTree>
     <p:extLst>
       <p:ext uri="{BB962C8B-B14F-4D97-AF65-F5344CB8AC3E}">
@@ -3705,6 +3723,36 @@
           </a:p>
         </p:txBody>
       </p:sp>
+      <p:pic>
+        <p:nvPicPr>
+          <p:cNvPr id="4" name="Picture 3">
+            <a:extLst>
+              <a:ext uri="{FF2B5EF4-FFF2-40B4-BE49-F238E27FC236}">
+                <a16:creationId xmlns:a16="http://schemas.microsoft.com/office/drawing/2014/main" id="{59DF03FD-DA87-479A-B5FF-7D0276202FF1}"/>
+              </a:ext>
+            </a:extLst>
+          </p:cNvPr>
+          <p:cNvPicPr>
+            <a:picLocks noChangeAspect="1"/>
+          </p:cNvPicPr>
+          <p:nvPr/>
+        </p:nvPicPr>
+        <p:blipFill>
+          <a:blip r:embed="rId2"/>
+          <a:stretch>
+            <a:fillRect/>
+          </a:stretch>
+        </p:blipFill>
+        <p:spPr>
+          <a:xfrm>
+            <a:off x="0" y="0"/>
+            <a:ext cx="12192000" cy="6859836"/>
+          </a:xfrm>
+          <a:prstGeom prst="rect">
+            <a:avLst/>
+          </a:prstGeom>
+        </p:spPr>
+      </p:pic>
     </p:spTree>
     <p:extLst>
       <p:ext uri="{BB962C8B-B14F-4D97-AF65-F5344CB8AC3E}">
@@ -3785,6 +3833,36 @@
           </a:p>
         </p:txBody>
       </p:sp>
+      <p:pic>
+        <p:nvPicPr>
+          <p:cNvPr id="4" name="Picture 3">
+            <a:extLst>
+              <a:ext uri="{FF2B5EF4-FFF2-40B4-BE49-F238E27FC236}">
+                <a16:creationId xmlns:a16="http://schemas.microsoft.com/office/drawing/2014/main" id="{B5F92AFE-4C51-483D-ACB2-8AD7A588C1B6}"/>
+              </a:ext>
+            </a:extLst>
+          </p:cNvPr>
+          <p:cNvPicPr>
+            <a:picLocks noChangeAspect="1"/>
+          </p:cNvPicPr>
+          <p:nvPr/>
+        </p:nvPicPr>
+        <p:blipFill>
+          <a:blip r:embed="rId2"/>
+          <a:stretch>
+            <a:fillRect/>
+          </a:stretch>
+        </p:blipFill>
+        <p:spPr>
+          <a:xfrm>
+            <a:off x="0" y="0"/>
+            <a:ext cx="12192000" cy="6859836"/>
+          </a:xfrm>
+          <a:prstGeom prst="rect">
+            <a:avLst/>
+          </a:prstGeom>
+        </p:spPr>
+      </p:pic>
     </p:spTree>
     <p:extLst>
       <p:ext uri="{BB962C8B-B14F-4D97-AF65-F5344CB8AC3E}">
@@ -3865,10 +3943,567 @@
           </a:p>
         </p:txBody>
       </p:sp>
+      <p:pic>
+        <p:nvPicPr>
+          <p:cNvPr id="4" name="Picture 3">
+            <a:extLst>
+              <a:ext uri="{FF2B5EF4-FFF2-40B4-BE49-F238E27FC236}">
+                <a16:creationId xmlns:a16="http://schemas.microsoft.com/office/drawing/2014/main" id="{D6B49B47-5AAE-456D-BD86-A9D3FBC0FAEE}"/>
+              </a:ext>
+            </a:extLst>
+          </p:cNvPr>
+          <p:cNvPicPr>
+            <a:picLocks noChangeAspect="1"/>
+          </p:cNvPicPr>
+          <p:nvPr/>
+        </p:nvPicPr>
+        <p:blipFill>
+          <a:blip r:embed="rId2"/>
+          <a:stretch>
+            <a:fillRect/>
+          </a:stretch>
+        </p:blipFill>
+        <p:spPr>
+          <a:xfrm>
+            <a:off x="0" y="0"/>
+            <a:ext cx="12192000" cy="6859836"/>
+          </a:xfrm>
+          <a:prstGeom prst="rect">
+            <a:avLst/>
+          </a:prstGeom>
+        </p:spPr>
+      </p:pic>
     </p:spTree>
     <p:extLst>
       <p:ext uri="{BB962C8B-B14F-4D97-AF65-F5344CB8AC3E}">
         <p14:creationId xmlns:p14="http://schemas.microsoft.com/office/powerpoint/2010/main" val="3247224475"/>
+      </p:ext>
+    </p:extLst>
+  </p:cSld>
+  <p:clrMapOvr>
+    <a:masterClrMapping/>
+  </p:clrMapOvr>
+</p:sld>
+</file>
+
+<file path=ppt/slides/slide15.xml><?xml version="1.0" encoding="utf-8"?>
+<p:sld xmlns:a="http://schemas.openxmlformats.org/drawingml/2006/main" xmlns:r="http://schemas.openxmlformats.org/officeDocument/2006/relationships" xmlns:p="http://schemas.openxmlformats.org/presentationml/2006/main">
+  <p:cSld>
+    <p:spTree>
+      <p:nvGrpSpPr>
+        <p:cNvPr id="1" name=""/>
+        <p:cNvGrpSpPr/>
+        <p:nvPr/>
+      </p:nvGrpSpPr>
+      <p:grpSpPr>
+        <a:xfrm>
+          <a:off x="0" y="0"/>
+          <a:ext cx="0" cy="0"/>
+          <a:chOff x="0" y="0"/>
+          <a:chExt cx="0" cy="0"/>
+        </a:xfrm>
+      </p:grpSpPr>
+      <p:sp>
+        <p:nvSpPr>
+          <p:cNvPr id="2" name="Title 1">
+            <a:extLst>
+              <a:ext uri="{FF2B5EF4-FFF2-40B4-BE49-F238E27FC236}">
+                <a16:creationId xmlns:a16="http://schemas.microsoft.com/office/drawing/2014/main" id="{1FCD93D6-ECC7-44F3-A87B-79AB511CF1D6}"/>
+              </a:ext>
+            </a:extLst>
+          </p:cNvPr>
+          <p:cNvSpPr>
+            <a:spLocks noGrp="1"/>
+          </p:cNvSpPr>
+          <p:nvPr>
+            <p:ph type="title"/>
+          </p:nvPr>
+        </p:nvSpPr>
+        <p:spPr/>
+        <p:txBody>
+          <a:bodyPr/>
+          <a:lstStyle/>
+          <a:p>
+            <a:endParaRPr lang="hr-HR"/>
+          </a:p>
+        </p:txBody>
+      </p:sp>
+      <p:pic>
+        <p:nvPicPr>
+          <p:cNvPr id="4" name="Content Placeholder 3">
+            <a:extLst>
+              <a:ext uri="{FF2B5EF4-FFF2-40B4-BE49-F238E27FC236}">
+                <a16:creationId xmlns:a16="http://schemas.microsoft.com/office/drawing/2014/main" id="{212D5203-6040-4F83-9ABF-165C5C7AD7CC}"/>
+              </a:ext>
+            </a:extLst>
+          </p:cNvPr>
+          <p:cNvPicPr>
+            <a:picLocks noGrp="1" noChangeAspect="1"/>
+          </p:cNvPicPr>
+          <p:nvPr>
+            <p:ph idx="1"/>
+          </p:nvPr>
+        </p:nvPicPr>
+        <p:blipFill>
+          <a:blip r:embed="rId2"/>
+          <a:stretch>
+            <a:fillRect/>
+          </a:stretch>
+        </p:blipFill>
+        <p:spPr>
+          <a:xfrm>
+            <a:off x="0" y="0"/>
+            <a:ext cx="12188736" cy="6858000"/>
+          </a:xfrm>
+          <a:prstGeom prst="rect">
+            <a:avLst/>
+          </a:prstGeom>
+        </p:spPr>
+      </p:pic>
+    </p:spTree>
+    <p:extLst>
+      <p:ext uri="{BB962C8B-B14F-4D97-AF65-F5344CB8AC3E}">
+        <p14:creationId xmlns:p14="http://schemas.microsoft.com/office/powerpoint/2010/main" val="3270324136"/>
+      </p:ext>
+    </p:extLst>
+  </p:cSld>
+  <p:clrMapOvr>
+    <a:masterClrMapping/>
+  </p:clrMapOvr>
+</p:sld>
+</file>
+
+<file path=ppt/slides/slide16.xml><?xml version="1.0" encoding="utf-8"?>
+<p:sld xmlns:a="http://schemas.openxmlformats.org/drawingml/2006/main" xmlns:r="http://schemas.openxmlformats.org/officeDocument/2006/relationships" xmlns:p="http://schemas.openxmlformats.org/presentationml/2006/main">
+  <p:cSld>
+    <p:spTree>
+      <p:nvGrpSpPr>
+        <p:cNvPr id="1" name=""/>
+        <p:cNvGrpSpPr/>
+        <p:nvPr/>
+      </p:nvGrpSpPr>
+      <p:grpSpPr>
+        <a:xfrm>
+          <a:off x="0" y="0"/>
+          <a:ext cx="0" cy="0"/>
+          <a:chOff x="0" y="0"/>
+          <a:chExt cx="0" cy="0"/>
+        </a:xfrm>
+      </p:grpSpPr>
+      <p:sp>
+        <p:nvSpPr>
+          <p:cNvPr id="2" name="Title 1">
+            <a:extLst>
+              <a:ext uri="{FF2B5EF4-FFF2-40B4-BE49-F238E27FC236}">
+                <a16:creationId xmlns:a16="http://schemas.microsoft.com/office/drawing/2014/main" id="{E8E83A71-F0C0-4B34-94D8-F939191DE628}"/>
+              </a:ext>
+            </a:extLst>
+          </p:cNvPr>
+          <p:cNvSpPr>
+            <a:spLocks noGrp="1"/>
+          </p:cNvSpPr>
+          <p:nvPr>
+            <p:ph type="title"/>
+          </p:nvPr>
+        </p:nvSpPr>
+        <p:spPr/>
+        <p:txBody>
+          <a:bodyPr/>
+          <a:lstStyle/>
+          <a:p>
+            <a:endParaRPr lang="hr-HR"/>
+          </a:p>
+        </p:txBody>
+      </p:sp>
+      <p:sp>
+        <p:nvSpPr>
+          <p:cNvPr id="3" name="Content Placeholder 2">
+            <a:extLst>
+              <a:ext uri="{FF2B5EF4-FFF2-40B4-BE49-F238E27FC236}">
+                <a16:creationId xmlns:a16="http://schemas.microsoft.com/office/drawing/2014/main" id="{DA04A015-58A3-409B-8F42-DE4E990B6B86}"/>
+              </a:ext>
+            </a:extLst>
+          </p:cNvPr>
+          <p:cNvSpPr>
+            <a:spLocks noGrp="1"/>
+          </p:cNvSpPr>
+          <p:nvPr>
+            <p:ph idx="1"/>
+          </p:nvPr>
+        </p:nvSpPr>
+        <p:spPr/>
+        <p:txBody>
+          <a:bodyPr/>
+          <a:lstStyle/>
+          <a:p>
+            <a:endParaRPr lang="hr-HR"/>
+          </a:p>
+        </p:txBody>
+      </p:sp>
+      <p:pic>
+        <p:nvPicPr>
+          <p:cNvPr id="4" name="Picture 3">
+            <a:extLst>
+              <a:ext uri="{FF2B5EF4-FFF2-40B4-BE49-F238E27FC236}">
+                <a16:creationId xmlns:a16="http://schemas.microsoft.com/office/drawing/2014/main" id="{22A5EC83-DA05-421F-AB02-530DC7C7B6AA}"/>
+              </a:ext>
+            </a:extLst>
+          </p:cNvPr>
+          <p:cNvPicPr>
+            <a:picLocks noChangeAspect="1"/>
+          </p:cNvPicPr>
+          <p:nvPr/>
+        </p:nvPicPr>
+        <p:blipFill>
+          <a:blip r:embed="rId2"/>
+          <a:stretch>
+            <a:fillRect/>
+          </a:stretch>
+        </p:blipFill>
+        <p:spPr>
+          <a:xfrm>
+            <a:off x="0" y="0"/>
+            <a:ext cx="12192000" cy="6859836"/>
+          </a:xfrm>
+          <a:prstGeom prst="rect">
+            <a:avLst/>
+          </a:prstGeom>
+        </p:spPr>
+      </p:pic>
+    </p:spTree>
+    <p:extLst>
+      <p:ext uri="{BB962C8B-B14F-4D97-AF65-F5344CB8AC3E}">
+        <p14:creationId xmlns:p14="http://schemas.microsoft.com/office/powerpoint/2010/main" val="2083164074"/>
+      </p:ext>
+    </p:extLst>
+  </p:cSld>
+  <p:clrMapOvr>
+    <a:masterClrMapping/>
+  </p:clrMapOvr>
+</p:sld>
+</file>
+
+<file path=ppt/slides/slide17.xml><?xml version="1.0" encoding="utf-8"?>
+<p:sld xmlns:a="http://schemas.openxmlformats.org/drawingml/2006/main" xmlns:r="http://schemas.openxmlformats.org/officeDocument/2006/relationships" xmlns:p="http://schemas.openxmlformats.org/presentationml/2006/main">
+  <p:cSld>
+    <p:spTree>
+      <p:nvGrpSpPr>
+        <p:cNvPr id="1" name=""/>
+        <p:cNvGrpSpPr/>
+        <p:nvPr/>
+      </p:nvGrpSpPr>
+      <p:grpSpPr>
+        <a:xfrm>
+          <a:off x="0" y="0"/>
+          <a:ext cx="0" cy="0"/>
+          <a:chOff x="0" y="0"/>
+          <a:chExt cx="0" cy="0"/>
+        </a:xfrm>
+      </p:grpSpPr>
+      <p:sp>
+        <p:nvSpPr>
+          <p:cNvPr id="2" name="Title 1">
+            <a:extLst>
+              <a:ext uri="{FF2B5EF4-FFF2-40B4-BE49-F238E27FC236}">
+                <a16:creationId xmlns:a16="http://schemas.microsoft.com/office/drawing/2014/main" id="{0EC2E93A-AE06-43E7-9912-952167B5C8A0}"/>
+              </a:ext>
+            </a:extLst>
+          </p:cNvPr>
+          <p:cNvSpPr>
+            <a:spLocks noGrp="1"/>
+          </p:cNvSpPr>
+          <p:nvPr>
+            <p:ph type="title"/>
+          </p:nvPr>
+        </p:nvSpPr>
+        <p:spPr/>
+        <p:txBody>
+          <a:bodyPr/>
+          <a:lstStyle/>
+          <a:p>
+            <a:endParaRPr lang="hr-HR"/>
+          </a:p>
+        </p:txBody>
+      </p:sp>
+      <p:sp>
+        <p:nvSpPr>
+          <p:cNvPr id="3" name="Content Placeholder 2">
+            <a:extLst>
+              <a:ext uri="{FF2B5EF4-FFF2-40B4-BE49-F238E27FC236}">
+                <a16:creationId xmlns:a16="http://schemas.microsoft.com/office/drawing/2014/main" id="{DD0CFA96-0696-447E-9331-270B12A98673}"/>
+              </a:ext>
+            </a:extLst>
+          </p:cNvPr>
+          <p:cNvSpPr>
+            <a:spLocks noGrp="1"/>
+          </p:cNvSpPr>
+          <p:nvPr>
+            <p:ph idx="1"/>
+          </p:nvPr>
+        </p:nvSpPr>
+        <p:spPr/>
+        <p:txBody>
+          <a:bodyPr/>
+          <a:lstStyle/>
+          <a:p>
+            <a:endParaRPr lang="hr-HR"/>
+          </a:p>
+        </p:txBody>
+      </p:sp>
+      <p:pic>
+        <p:nvPicPr>
+          <p:cNvPr id="4" name="Picture 3">
+            <a:extLst>
+              <a:ext uri="{FF2B5EF4-FFF2-40B4-BE49-F238E27FC236}">
+                <a16:creationId xmlns:a16="http://schemas.microsoft.com/office/drawing/2014/main" id="{B08E171F-AA7A-4519-A180-BB5D7111FF1A}"/>
+              </a:ext>
+            </a:extLst>
+          </p:cNvPr>
+          <p:cNvPicPr>
+            <a:picLocks noChangeAspect="1"/>
+          </p:cNvPicPr>
+          <p:nvPr/>
+        </p:nvPicPr>
+        <p:blipFill>
+          <a:blip r:embed="rId2"/>
+          <a:stretch>
+            <a:fillRect/>
+          </a:stretch>
+        </p:blipFill>
+        <p:spPr>
+          <a:xfrm>
+            <a:off x="0" y="0"/>
+            <a:ext cx="12192000" cy="6859836"/>
+          </a:xfrm>
+          <a:prstGeom prst="rect">
+            <a:avLst/>
+          </a:prstGeom>
+        </p:spPr>
+      </p:pic>
+    </p:spTree>
+    <p:extLst>
+      <p:ext uri="{BB962C8B-B14F-4D97-AF65-F5344CB8AC3E}">
+        <p14:creationId xmlns:p14="http://schemas.microsoft.com/office/powerpoint/2010/main" val="788020411"/>
+      </p:ext>
+    </p:extLst>
+  </p:cSld>
+  <p:clrMapOvr>
+    <a:masterClrMapping/>
+  </p:clrMapOvr>
+</p:sld>
+</file>
+
+<file path=ppt/slides/slide18.xml><?xml version="1.0" encoding="utf-8"?>
+<p:sld xmlns:a="http://schemas.openxmlformats.org/drawingml/2006/main" xmlns:r="http://schemas.openxmlformats.org/officeDocument/2006/relationships" xmlns:p="http://schemas.openxmlformats.org/presentationml/2006/main">
+  <p:cSld>
+    <p:spTree>
+      <p:nvGrpSpPr>
+        <p:cNvPr id="1" name=""/>
+        <p:cNvGrpSpPr/>
+        <p:nvPr/>
+      </p:nvGrpSpPr>
+      <p:grpSpPr>
+        <a:xfrm>
+          <a:off x="0" y="0"/>
+          <a:ext cx="0" cy="0"/>
+          <a:chOff x="0" y="0"/>
+          <a:chExt cx="0" cy="0"/>
+        </a:xfrm>
+      </p:grpSpPr>
+      <p:sp>
+        <p:nvSpPr>
+          <p:cNvPr id="2" name="Title 1">
+            <a:extLst>
+              <a:ext uri="{FF2B5EF4-FFF2-40B4-BE49-F238E27FC236}">
+                <a16:creationId xmlns:a16="http://schemas.microsoft.com/office/drawing/2014/main" id="{15FB5196-EC13-4C3A-ABCF-35936F90FE65}"/>
+              </a:ext>
+            </a:extLst>
+          </p:cNvPr>
+          <p:cNvSpPr>
+            <a:spLocks noGrp="1"/>
+          </p:cNvSpPr>
+          <p:nvPr>
+            <p:ph type="title"/>
+          </p:nvPr>
+        </p:nvSpPr>
+        <p:spPr/>
+        <p:txBody>
+          <a:bodyPr/>
+          <a:lstStyle/>
+          <a:p>
+            <a:endParaRPr lang="hr-HR"/>
+          </a:p>
+        </p:txBody>
+      </p:sp>
+      <p:sp>
+        <p:nvSpPr>
+          <p:cNvPr id="3" name="Content Placeholder 2">
+            <a:extLst>
+              <a:ext uri="{FF2B5EF4-FFF2-40B4-BE49-F238E27FC236}">
+                <a16:creationId xmlns:a16="http://schemas.microsoft.com/office/drawing/2014/main" id="{A084F44F-29AE-4C34-8395-0ED43BC1E804}"/>
+              </a:ext>
+            </a:extLst>
+          </p:cNvPr>
+          <p:cNvSpPr>
+            <a:spLocks noGrp="1"/>
+          </p:cNvSpPr>
+          <p:nvPr>
+            <p:ph idx="1"/>
+          </p:nvPr>
+        </p:nvSpPr>
+        <p:spPr/>
+        <p:txBody>
+          <a:bodyPr/>
+          <a:lstStyle/>
+          <a:p>
+            <a:endParaRPr lang="hr-HR"/>
+          </a:p>
+        </p:txBody>
+      </p:sp>
+      <p:pic>
+        <p:nvPicPr>
+          <p:cNvPr id="4" name="Picture 3">
+            <a:extLst>
+              <a:ext uri="{FF2B5EF4-FFF2-40B4-BE49-F238E27FC236}">
+                <a16:creationId xmlns:a16="http://schemas.microsoft.com/office/drawing/2014/main" id="{FB8F8007-7A5F-4340-9337-25C79ECBA1B6}"/>
+              </a:ext>
+            </a:extLst>
+          </p:cNvPr>
+          <p:cNvPicPr>
+            <a:picLocks noChangeAspect="1"/>
+          </p:cNvPicPr>
+          <p:nvPr/>
+        </p:nvPicPr>
+        <p:blipFill>
+          <a:blip r:embed="rId2"/>
+          <a:stretch>
+            <a:fillRect/>
+          </a:stretch>
+        </p:blipFill>
+        <p:spPr>
+          <a:xfrm>
+            <a:off x="0" y="0"/>
+            <a:ext cx="12192000" cy="6859836"/>
+          </a:xfrm>
+          <a:prstGeom prst="rect">
+            <a:avLst/>
+          </a:prstGeom>
+        </p:spPr>
+      </p:pic>
+    </p:spTree>
+    <p:extLst>
+      <p:ext uri="{BB962C8B-B14F-4D97-AF65-F5344CB8AC3E}">
+        <p14:creationId xmlns:p14="http://schemas.microsoft.com/office/powerpoint/2010/main" val="3716796148"/>
+      </p:ext>
+    </p:extLst>
+  </p:cSld>
+  <p:clrMapOvr>
+    <a:masterClrMapping/>
+  </p:clrMapOvr>
+</p:sld>
+</file>
+
+<file path=ppt/slides/slide19.xml><?xml version="1.0" encoding="utf-8"?>
+<p:sld xmlns:a="http://schemas.openxmlformats.org/drawingml/2006/main" xmlns:r="http://schemas.openxmlformats.org/officeDocument/2006/relationships" xmlns:p="http://schemas.openxmlformats.org/presentationml/2006/main">
+  <p:cSld>
+    <p:spTree>
+      <p:nvGrpSpPr>
+        <p:cNvPr id="1" name=""/>
+        <p:cNvGrpSpPr/>
+        <p:nvPr/>
+      </p:nvGrpSpPr>
+      <p:grpSpPr>
+        <a:xfrm>
+          <a:off x="0" y="0"/>
+          <a:ext cx="0" cy="0"/>
+          <a:chOff x="0" y="0"/>
+          <a:chExt cx="0" cy="0"/>
+        </a:xfrm>
+      </p:grpSpPr>
+      <p:sp>
+        <p:nvSpPr>
+          <p:cNvPr id="2" name="Title 1">
+            <a:extLst>
+              <a:ext uri="{FF2B5EF4-FFF2-40B4-BE49-F238E27FC236}">
+                <a16:creationId xmlns:a16="http://schemas.microsoft.com/office/drawing/2014/main" id="{A3E55D4A-2928-49FA-BFC7-0D9A3C820637}"/>
+              </a:ext>
+            </a:extLst>
+          </p:cNvPr>
+          <p:cNvSpPr>
+            <a:spLocks noGrp="1"/>
+          </p:cNvSpPr>
+          <p:nvPr>
+            <p:ph type="title"/>
+          </p:nvPr>
+        </p:nvSpPr>
+        <p:spPr/>
+        <p:txBody>
+          <a:bodyPr/>
+          <a:lstStyle/>
+          <a:p>
+            <a:endParaRPr lang="hr-HR"/>
+          </a:p>
+        </p:txBody>
+      </p:sp>
+      <p:sp>
+        <p:nvSpPr>
+          <p:cNvPr id="3" name="Content Placeholder 2">
+            <a:extLst>
+              <a:ext uri="{FF2B5EF4-FFF2-40B4-BE49-F238E27FC236}">
+                <a16:creationId xmlns:a16="http://schemas.microsoft.com/office/drawing/2014/main" id="{02A13711-72FF-49A4-8689-560F5D16CFA8}"/>
+              </a:ext>
+            </a:extLst>
+          </p:cNvPr>
+          <p:cNvSpPr>
+            <a:spLocks noGrp="1"/>
+          </p:cNvSpPr>
+          <p:nvPr>
+            <p:ph idx="1"/>
+          </p:nvPr>
+        </p:nvSpPr>
+        <p:spPr/>
+        <p:txBody>
+          <a:bodyPr/>
+          <a:lstStyle/>
+          <a:p>
+            <a:endParaRPr lang="hr-HR"/>
+          </a:p>
+        </p:txBody>
+      </p:sp>
+      <p:pic>
+        <p:nvPicPr>
+          <p:cNvPr id="4" name="Picture 3">
+            <a:extLst>
+              <a:ext uri="{FF2B5EF4-FFF2-40B4-BE49-F238E27FC236}">
+                <a16:creationId xmlns:a16="http://schemas.microsoft.com/office/drawing/2014/main" id="{82F887CF-3BEE-4418-8D81-47C53BD7C349}"/>
+              </a:ext>
+            </a:extLst>
+          </p:cNvPr>
+          <p:cNvPicPr>
+            <a:picLocks noChangeAspect="1"/>
+          </p:cNvPicPr>
+          <p:nvPr/>
+        </p:nvPicPr>
+        <p:blipFill>
+          <a:blip r:embed="rId2"/>
+          <a:stretch>
+            <a:fillRect/>
+          </a:stretch>
+        </p:blipFill>
+        <p:spPr>
+          <a:xfrm>
+            <a:off x="0" y="0"/>
+            <a:ext cx="12192000" cy="6859836"/>
+          </a:xfrm>
+          <a:prstGeom prst="rect">
+            <a:avLst/>
+          </a:prstGeom>
+        </p:spPr>
+      </p:pic>
+    </p:spTree>
+    <p:extLst>
+      <p:ext uri="{BB962C8B-B14F-4D97-AF65-F5344CB8AC3E}">
+        <p14:creationId xmlns:p14="http://schemas.microsoft.com/office/powerpoint/2010/main" val="789061151"/>
       </p:ext>
     </p:extLst>
   </p:cSld>
@@ -3979,6 +4614,86 @@
     <p:extLst>
       <p:ext uri="{BB962C8B-B14F-4D97-AF65-F5344CB8AC3E}">
         <p14:creationId xmlns:p14="http://schemas.microsoft.com/office/powerpoint/2010/main" val="1044875619"/>
+      </p:ext>
+    </p:extLst>
+  </p:cSld>
+  <p:clrMapOvr>
+    <a:masterClrMapping/>
+  </p:clrMapOvr>
+</p:sld>
+</file>
+
+<file path=ppt/slides/slide20.xml><?xml version="1.0" encoding="utf-8"?>
+<p:sld xmlns:a="http://schemas.openxmlformats.org/drawingml/2006/main" xmlns:r="http://schemas.openxmlformats.org/officeDocument/2006/relationships" xmlns:p="http://schemas.openxmlformats.org/presentationml/2006/main">
+  <p:cSld>
+    <p:spTree>
+      <p:nvGrpSpPr>
+        <p:cNvPr id="1" name=""/>
+        <p:cNvGrpSpPr/>
+        <p:nvPr/>
+      </p:nvGrpSpPr>
+      <p:grpSpPr>
+        <a:xfrm>
+          <a:off x="0" y="0"/>
+          <a:ext cx="0" cy="0"/>
+          <a:chOff x="0" y="0"/>
+          <a:chExt cx="0" cy="0"/>
+        </a:xfrm>
+      </p:grpSpPr>
+      <p:sp>
+        <p:nvSpPr>
+          <p:cNvPr id="2" name="Title 1">
+            <a:extLst>
+              <a:ext uri="{FF2B5EF4-FFF2-40B4-BE49-F238E27FC236}">
+                <a16:creationId xmlns:a16="http://schemas.microsoft.com/office/drawing/2014/main" id="{A181ABFD-95E0-46A9-A420-9098952603B7}"/>
+              </a:ext>
+            </a:extLst>
+          </p:cNvPr>
+          <p:cNvSpPr>
+            <a:spLocks noGrp="1"/>
+          </p:cNvSpPr>
+          <p:nvPr>
+            <p:ph type="title"/>
+          </p:nvPr>
+        </p:nvSpPr>
+        <p:spPr/>
+        <p:txBody>
+          <a:bodyPr/>
+          <a:lstStyle/>
+          <a:p>
+            <a:endParaRPr lang="hr-HR"/>
+          </a:p>
+        </p:txBody>
+      </p:sp>
+      <p:sp>
+        <p:nvSpPr>
+          <p:cNvPr id="3" name="Content Placeholder 2">
+            <a:extLst>
+              <a:ext uri="{FF2B5EF4-FFF2-40B4-BE49-F238E27FC236}">
+                <a16:creationId xmlns:a16="http://schemas.microsoft.com/office/drawing/2014/main" id="{70F88EE9-D9DF-4BA0-91D3-0F0EC437EC0A}"/>
+              </a:ext>
+            </a:extLst>
+          </p:cNvPr>
+          <p:cNvSpPr>
+            <a:spLocks noGrp="1"/>
+          </p:cNvSpPr>
+          <p:nvPr>
+            <p:ph idx="1"/>
+          </p:nvPr>
+        </p:nvSpPr>
+        <p:spPr/>
+        <p:txBody>
+          <a:bodyPr/>
+          <a:lstStyle/>
+          <a:p>
+            <a:endParaRPr lang="hr-HR"/>
+          </a:p>
+        </p:txBody>
+      </p:sp>
+    </p:spTree>
+    <p:extLst>
+      <p:ext uri="{BB962C8B-B14F-4D97-AF65-F5344CB8AC3E}">
+        <p14:creationId xmlns:p14="http://schemas.microsoft.com/office/powerpoint/2010/main" val="185788902"/>
       </p:ext>
     </p:extLst>
   </p:cSld>

</xml_diff>

<commit_message>
Week 3 slides 4 update
</commit_message>
<xml_diff>
--- a/course2/ML Data Lifecycle in Production - Week 3 Slides.pptx
+++ b/course2/ML Data Lifecycle in Production - Week 3 Slides.pptx
@@ -25,6 +25,17 @@
     <p:sldId id="274" r:id="rId19"/>
     <p:sldId id="275" r:id="rId20"/>
     <p:sldId id="276" r:id="rId21"/>
+    <p:sldId id="281" r:id="rId22"/>
+    <p:sldId id="277" r:id="rId23"/>
+    <p:sldId id="278" r:id="rId24"/>
+    <p:sldId id="279" r:id="rId25"/>
+    <p:sldId id="280" r:id="rId26"/>
+    <p:sldId id="282" r:id="rId27"/>
+    <p:sldId id="283" r:id="rId28"/>
+    <p:sldId id="284" r:id="rId29"/>
+    <p:sldId id="285" r:id="rId30"/>
+    <p:sldId id="286" r:id="rId31"/>
+    <p:sldId id="287" r:id="rId32"/>
   </p:sldIdLst>
   <p:sldSz cx="12192000" cy="6858000"/>
   <p:notesSz cx="6858000" cy="9144000"/>
@@ -4690,10 +4701,977 @@
           </a:p>
         </p:txBody>
       </p:sp>
+      <p:pic>
+        <p:nvPicPr>
+          <p:cNvPr id="4" name="Picture 3">
+            <a:extLst>
+              <a:ext uri="{FF2B5EF4-FFF2-40B4-BE49-F238E27FC236}">
+                <a16:creationId xmlns:a16="http://schemas.microsoft.com/office/drawing/2014/main" id="{A77DEC2F-6672-47A7-A109-E5D38FD2D614}"/>
+              </a:ext>
+            </a:extLst>
+          </p:cNvPr>
+          <p:cNvPicPr>
+            <a:picLocks noChangeAspect="1"/>
+          </p:cNvPicPr>
+          <p:nvPr/>
+        </p:nvPicPr>
+        <p:blipFill>
+          <a:blip r:embed="rId2"/>
+          <a:stretch>
+            <a:fillRect/>
+          </a:stretch>
+        </p:blipFill>
+        <p:spPr>
+          <a:xfrm>
+            <a:off x="0" y="0"/>
+            <a:ext cx="12192000" cy="6858001"/>
+          </a:xfrm>
+          <a:prstGeom prst="rect">
+            <a:avLst/>
+          </a:prstGeom>
+        </p:spPr>
+      </p:pic>
     </p:spTree>
     <p:extLst>
       <p:ext uri="{BB962C8B-B14F-4D97-AF65-F5344CB8AC3E}">
         <p14:creationId xmlns:p14="http://schemas.microsoft.com/office/powerpoint/2010/main" val="185788902"/>
+      </p:ext>
+    </p:extLst>
+  </p:cSld>
+  <p:clrMapOvr>
+    <a:masterClrMapping/>
+  </p:clrMapOvr>
+</p:sld>
+</file>
+
+<file path=ppt/slides/slide21.xml><?xml version="1.0" encoding="utf-8"?>
+<p:sld xmlns:a="http://schemas.openxmlformats.org/drawingml/2006/main" xmlns:r="http://schemas.openxmlformats.org/officeDocument/2006/relationships" xmlns:p="http://schemas.openxmlformats.org/presentationml/2006/main">
+  <p:cSld>
+    <p:spTree>
+      <p:nvGrpSpPr>
+        <p:cNvPr id="1" name=""/>
+        <p:cNvGrpSpPr/>
+        <p:nvPr/>
+      </p:nvGrpSpPr>
+      <p:grpSpPr>
+        <a:xfrm>
+          <a:off x="0" y="0"/>
+          <a:ext cx="0" cy="0"/>
+          <a:chOff x="0" y="0"/>
+          <a:chExt cx="0" cy="0"/>
+        </a:xfrm>
+      </p:grpSpPr>
+      <p:sp>
+        <p:nvSpPr>
+          <p:cNvPr id="2" name="Title 1">
+            <a:extLst>
+              <a:ext uri="{FF2B5EF4-FFF2-40B4-BE49-F238E27FC236}">
+                <a16:creationId xmlns:a16="http://schemas.microsoft.com/office/drawing/2014/main" id="{8BDA23A5-A941-4381-A509-DE93876049FE}"/>
+              </a:ext>
+            </a:extLst>
+          </p:cNvPr>
+          <p:cNvSpPr>
+            <a:spLocks noGrp="1"/>
+          </p:cNvSpPr>
+          <p:nvPr>
+            <p:ph type="title"/>
+          </p:nvPr>
+        </p:nvSpPr>
+        <p:spPr/>
+        <p:txBody>
+          <a:bodyPr/>
+          <a:lstStyle/>
+          <a:p>
+            <a:endParaRPr lang="en-US"/>
+          </a:p>
+        </p:txBody>
+      </p:sp>
+      <p:pic>
+        <p:nvPicPr>
+          <p:cNvPr id="4" name="Content Placeholder 3">
+            <a:extLst>
+              <a:ext uri="{FF2B5EF4-FFF2-40B4-BE49-F238E27FC236}">
+                <a16:creationId xmlns:a16="http://schemas.microsoft.com/office/drawing/2014/main" id="{75B6A061-6B6C-4864-8416-00D9887385C5}"/>
+              </a:ext>
+            </a:extLst>
+          </p:cNvPr>
+          <p:cNvPicPr>
+            <a:picLocks noGrp="1" noChangeAspect="1"/>
+          </p:cNvPicPr>
+          <p:nvPr>
+            <p:ph idx="1"/>
+          </p:nvPr>
+        </p:nvPicPr>
+        <p:blipFill>
+          <a:blip r:embed="rId2"/>
+          <a:stretch>
+            <a:fillRect/>
+          </a:stretch>
+        </p:blipFill>
+        <p:spPr>
+          <a:xfrm>
+            <a:off x="0" y="-1"/>
+            <a:ext cx="12192000" cy="6858001"/>
+          </a:xfrm>
+          <a:prstGeom prst="rect">
+            <a:avLst/>
+          </a:prstGeom>
+        </p:spPr>
+      </p:pic>
+    </p:spTree>
+    <p:extLst>
+      <p:ext uri="{BB962C8B-B14F-4D97-AF65-F5344CB8AC3E}">
+        <p14:creationId xmlns:p14="http://schemas.microsoft.com/office/powerpoint/2010/main" val="717401674"/>
+      </p:ext>
+    </p:extLst>
+  </p:cSld>
+  <p:clrMapOvr>
+    <a:masterClrMapping/>
+  </p:clrMapOvr>
+</p:sld>
+</file>
+
+<file path=ppt/slides/slide22.xml><?xml version="1.0" encoding="utf-8"?>
+<p:sld xmlns:a="http://schemas.openxmlformats.org/drawingml/2006/main" xmlns:r="http://schemas.openxmlformats.org/officeDocument/2006/relationships" xmlns:p="http://schemas.openxmlformats.org/presentationml/2006/main">
+  <p:cSld>
+    <p:spTree>
+      <p:nvGrpSpPr>
+        <p:cNvPr id="1" name=""/>
+        <p:cNvGrpSpPr/>
+        <p:nvPr/>
+      </p:nvGrpSpPr>
+      <p:grpSpPr>
+        <a:xfrm>
+          <a:off x="0" y="0"/>
+          <a:ext cx="0" cy="0"/>
+          <a:chOff x="0" y="0"/>
+          <a:chExt cx="0" cy="0"/>
+        </a:xfrm>
+      </p:grpSpPr>
+      <p:sp>
+        <p:nvSpPr>
+          <p:cNvPr id="2" name="Title 1">
+            <a:extLst>
+              <a:ext uri="{FF2B5EF4-FFF2-40B4-BE49-F238E27FC236}">
+                <a16:creationId xmlns:a16="http://schemas.microsoft.com/office/drawing/2014/main" id="{F530FF64-BB56-472F-AF26-05AD8624BCF3}"/>
+              </a:ext>
+            </a:extLst>
+          </p:cNvPr>
+          <p:cNvSpPr>
+            <a:spLocks noGrp="1"/>
+          </p:cNvSpPr>
+          <p:nvPr>
+            <p:ph type="title"/>
+          </p:nvPr>
+        </p:nvSpPr>
+        <p:spPr/>
+        <p:txBody>
+          <a:bodyPr/>
+          <a:lstStyle/>
+          <a:p>
+            <a:endParaRPr lang="en-US"/>
+          </a:p>
+        </p:txBody>
+      </p:sp>
+      <p:sp>
+        <p:nvSpPr>
+          <p:cNvPr id="3" name="Content Placeholder 2">
+            <a:extLst>
+              <a:ext uri="{FF2B5EF4-FFF2-40B4-BE49-F238E27FC236}">
+                <a16:creationId xmlns:a16="http://schemas.microsoft.com/office/drawing/2014/main" id="{86CD00F0-EBFB-4814-8502-ADD864463860}"/>
+              </a:ext>
+            </a:extLst>
+          </p:cNvPr>
+          <p:cNvSpPr>
+            <a:spLocks noGrp="1"/>
+          </p:cNvSpPr>
+          <p:nvPr>
+            <p:ph idx="1"/>
+          </p:nvPr>
+        </p:nvSpPr>
+        <p:spPr/>
+        <p:txBody>
+          <a:bodyPr/>
+          <a:lstStyle/>
+          <a:p>
+            <a:endParaRPr lang="en-US"/>
+          </a:p>
+        </p:txBody>
+      </p:sp>
+      <p:pic>
+        <p:nvPicPr>
+          <p:cNvPr id="4" name="Picture 3">
+            <a:extLst>
+              <a:ext uri="{FF2B5EF4-FFF2-40B4-BE49-F238E27FC236}">
+                <a16:creationId xmlns:a16="http://schemas.microsoft.com/office/drawing/2014/main" id="{F04A168D-3A18-439C-A97C-3F5271A92940}"/>
+              </a:ext>
+            </a:extLst>
+          </p:cNvPr>
+          <p:cNvPicPr>
+            <a:picLocks noChangeAspect="1"/>
+          </p:cNvPicPr>
+          <p:nvPr/>
+        </p:nvPicPr>
+        <p:blipFill>
+          <a:blip r:embed="rId2"/>
+          <a:stretch>
+            <a:fillRect/>
+          </a:stretch>
+        </p:blipFill>
+        <p:spPr>
+          <a:xfrm>
+            <a:off x="0" y="0"/>
+            <a:ext cx="12192000" cy="6858001"/>
+          </a:xfrm>
+          <a:prstGeom prst="rect">
+            <a:avLst/>
+          </a:prstGeom>
+        </p:spPr>
+      </p:pic>
+    </p:spTree>
+    <p:extLst>
+      <p:ext uri="{BB962C8B-B14F-4D97-AF65-F5344CB8AC3E}">
+        <p14:creationId xmlns:p14="http://schemas.microsoft.com/office/powerpoint/2010/main" val="2383859618"/>
+      </p:ext>
+    </p:extLst>
+  </p:cSld>
+  <p:clrMapOvr>
+    <a:masterClrMapping/>
+  </p:clrMapOvr>
+</p:sld>
+</file>
+
+<file path=ppt/slides/slide23.xml><?xml version="1.0" encoding="utf-8"?>
+<p:sld xmlns:a="http://schemas.openxmlformats.org/drawingml/2006/main" xmlns:r="http://schemas.openxmlformats.org/officeDocument/2006/relationships" xmlns:p="http://schemas.openxmlformats.org/presentationml/2006/main">
+  <p:cSld>
+    <p:spTree>
+      <p:nvGrpSpPr>
+        <p:cNvPr id="1" name=""/>
+        <p:cNvGrpSpPr/>
+        <p:nvPr/>
+      </p:nvGrpSpPr>
+      <p:grpSpPr>
+        <a:xfrm>
+          <a:off x="0" y="0"/>
+          <a:ext cx="0" cy="0"/>
+          <a:chOff x="0" y="0"/>
+          <a:chExt cx="0" cy="0"/>
+        </a:xfrm>
+      </p:grpSpPr>
+      <p:sp>
+        <p:nvSpPr>
+          <p:cNvPr id="2" name="Title 1">
+            <a:extLst>
+              <a:ext uri="{FF2B5EF4-FFF2-40B4-BE49-F238E27FC236}">
+                <a16:creationId xmlns:a16="http://schemas.microsoft.com/office/drawing/2014/main" id="{AD98EA4F-753C-4A8F-964A-D15B24628189}"/>
+              </a:ext>
+            </a:extLst>
+          </p:cNvPr>
+          <p:cNvSpPr>
+            <a:spLocks noGrp="1"/>
+          </p:cNvSpPr>
+          <p:nvPr>
+            <p:ph type="title"/>
+          </p:nvPr>
+        </p:nvSpPr>
+        <p:spPr/>
+        <p:txBody>
+          <a:bodyPr/>
+          <a:lstStyle/>
+          <a:p>
+            <a:endParaRPr lang="en-US"/>
+          </a:p>
+        </p:txBody>
+      </p:sp>
+      <p:sp>
+        <p:nvSpPr>
+          <p:cNvPr id="3" name="Content Placeholder 2">
+            <a:extLst>
+              <a:ext uri="{FF2B5EF4-FFF2-40B4-BE49-F238E27FC236}">
+                <a16:creationId xmlns:a16="http://schemas.microsoft.com/office/drawing/2014/main" id="{3F1C2224-8865-4895-8510-E6990663A8FF}"/>
+              </a:ext>
+            </a:extLst>
+          </p:cNvPr>
+          <p:cNvSpPr>
+            <a:spLocks noGrp="1"/>
+          </p:cNvSpPr>
+          <p:nvPr>
+            <p:ph idx="1"/>
+          </p:nvPr>
+        </p:nvSpPr>
+        <p:spPr/>
+        <p:txBody>
+          <a:bodyPr/>
+          <a:lstStyle/>
+          <a:p>
+            <a:endParaRPr lang="en-US"/>
+          </a:p>
+        </p:txBody>
+      </p:sp>
+      <p:pic>
+        <p:nvPicPr>
+          <p:cNvPr id="4" name="Picture 3">
+            <a:extLst>
+              <a:ext uri="{FF2B5EF4-FFF2-40B4-BE49-F238E27FC236}">
+                <a16:creationId xmlns:a16="http://schemas.microsoft.com/office/drawing/2014/main" id="{B3BEAF6D-A164-46BC-98BC-BC89238E4EA8}"/>
+              </a:ext>
+            </a:extLst>
+          </p:cNvPr>
+          <p:cNvPicPr>
+            <a:picLocks noChangeAspect="1"/>
+          </p:cNvPicPr>
+          <p:nvPr/>
+        </p:nvPicPr>
+        <p:blipFill>
+          <a:blip r:embed="rId2"/>
+          <a:stretch>
+            <a:fillRect/>
+          </a:stretch>
+        </p:blipFill>
+        <p:spPr>
+          <a:xfrm>
+            <a:off x="0" y="0"/>
+            <a:ext cx="12192000" cy="6858001"/>
+          </a:xfrm>
+          <a:prstGeom prst="rect">
+            <a:avLst/>
+          </a:prstGeom>
+        </p:spPr>
+      </p:pic>
+    </p:spTree>
+    <p:extLst>
+      <p:ext uri="{BB962C8B-B14F-4D97-AF65-F5344CB8AC3E}">
+        <p14:creationId xmlns:p14="http://schemas.microsoft.com/office/powerpoint/2010/main" val="1927752803"/>
+      </p:ext>
+    </p:extLst>
+  </p:cSld>
+  <p:clrMapOvr>
+    <a:masterClrMapping/>
+  </p:clrMapOvr>
+</p:sld>
+</file>
+
+<file path=ppt/slides/slide24.xml><?xml version="1.0" encoding="utf-8"?>
+<p:sld xmlns:a="http://schemas.openxmlformats.org/drawingml/2006/main" xmlns:r="http://schemas.openxmlformats.org/officeDocument/2006/relationships" xmlns:p="http://schemas.openxmlformats.org/presentationml/2006/main">
+  <p:cSld>
+    <p:spTree>
+      <p:nvGrpSpPr>
+        <p:cNvPr id="1" name=""/>
+        <p:cNvGrpSpPr/>
+        <p:nvPr/>
+      </p:nvGrpSpPr>
+      <p:grpSpPr>
+        <a:xfrm>
+          <a:off x="0" y="0"/>
+          <a:ext cx="0" cy="0"/>
+          <a:chOff x="0" y="0"/>
+          <a:chExt cx="0" cy="0"/>
+        </a:xfrm>
+      </p:grpSpPr>
+      <p:sp>
+        <p:nvSpPr>
+          <p:cNvPr id="2" name="Title 1">
+            <a:extLst>
+              <a:ext uri="{FF2B5EF4-FFF2-40B4-BE49-F238E27FC236}">
+                <a16:creationId xmlns:a16="http://schemas.microsoft.com/office/drawing/2014/main" id="{972CF863-4011-45EB-86D9-C921B3128E77}"/>
+              </a:ext>
+            </a:extLst>
+          </p:cNvPr>
+          <p:cNvSpPr>
+            <a:spLocks noGrp="1"/>
+          </p:cNvSpPr>
+          <p:nvPr>
+            <p:ph type="title"/>
+          </p:nvPr>
+        </p:nvSpPr>
+        <p:spPr/>
+        <p:txBody>
+          <a:bodyPr/>
+          <a:lstStyle/>
+          <a:p>
+            <a:endParaRPr lang="en-US"/>
+          </a:p>
+        </p:txBody>
+      </p:sp>
+      <p:sp>
+        <p:nvSpPr>
+          <p:cNvPr id="3" name="Content Placeholder 2">
+            <a:extLst>
+              <a:ext uri="{FF2B5EF4-FFF2-40B4-BE49-F238E27FC236}">
+                <a16:creationId xmlns:a16="http://schemas.microsoft.com/office/drawing/2014/main" id="{98721D93-0368-40A3-A725-FF0E129448CE}"/>
+              </a:ext>
+            </a:extLst>
+          </p:cNvPr>
+          <p:cNvSpPr>
+            <a:spLocks noGrp="1"/>
+          </p:cNvSpPr>
+          <p:nvPr>
+            <p:ph idx="1"/>
+          </p:nvPr>
+        </p:nvSpPr>
+        <p:spPr/>
+        <p:txBody>
+          <a:bodyPr/>
+          <a:lstStyle/>
+          <a:p>
+            <a:endParaRPr lang="en-US"/>
+          </a:p>
+        </p:txBody>
+      </p:sp>
+      <p:pic>
+        <p:nvPicPr>
+          <p:cNvPr id="4" name="Picture 3">
+            <a:extLst>
+              <a:ext uri="{FF2B5EF4-FFF2-40B4-BE49-F238E27FC236}">
+                <a16:creationId xmlns:a16="http://schemas.microsoft.com/office/drawing/2014/main" id="{1C3BEBBE-BD71-4BB6-A8DF-F27B3DF9033C}"/>
+              </a:ext>
+            </a:extLst>
+          </p:cNvPr>
+          <p:cNvPicPr>
+            <a:picLocks noChangeAspect="1"/>
+          </p:cNvPicPr>
+          <p:nvPr/>
+        </p:nvPicPr>
+        <p:blipFill>
+          <a:blip r:embed="rId2"/>
+          <a:stretch>
+            <a:fillRect/>
+          </a:stretch>
+        </p:blipFill>
+        <p:spPr>
+          <a:xfrm>
+            <a:off x="0" y="0"/>
+            <a:ext cx="12192000" cy="6858001"/>
+          </a:xfrm>
+          <a:prstGeom prst="rect">
+            <a:avLst/>
+          </a:prstGeom>
+        </p:spPr>
+      </p:pic>
+    </p:spTree>
+    <p:extLst>
+      <p:ext uri="{BB962C8B-B14F-4D97-AF65-F5344CB8AC3E}">
+        <p14:creationId xmlns:p14="http://schemas.microsoft.com/office/powerpoint/2010/main" val="2809550778"/>
+      </p:ext>
+    </p:extLst>
+  </p:cSld>
+  <p:clrMapOvr>
+    <a:masterClrMapping/>
+  </p:clrMapOvr>
+</p:sld>
+</file>
+
+<file path=ppt/slides/slide25.xml><?xml version="1.0" encoding="utf-8"?>
+<p:sld xmlns:a="http://schemas.openxmlformats.org/drawingml/2006/main" xmlns:r="http://schemas.openxmlformats.org/officeDocument/2006/relationships" xmlns:p="http://schemas.openxmlformats.org/presentationml/2006/main">
+  <p:cSld>
+    <p:spTree>
+      <p:nvGrpSpPr>
+        <p:cNvPr id="1" name=""/>
+        <p:cNvGrpSpPr/>
+        <p:nvPr/>
+      </p:nvGrpSpPr>
+      <p:grpSpPr>
+        <a:xfrm>
+          <a:off x="0" y="0"/>
+          <a:ext cx="0" cy="0"/>
+          <a:chOff x="0" y="0"/>
+          <a:chExt cx="0" cy="0"/>
+        </a:xfrm>
+      </p:grpSpPr>
+      <p:sp>
+        <p:nvSpPr>
+          <p:cNvPr id="2" name="Title 1">
+            <a:extLst>
+              <a:ext uri="{FF2B5EF4-FFF2-40B4-BE49-F238E27FC236}">
+                <a16:creationId xmlns:a16="http://schemas.microsoft.com/office/drawing/2014/main" id="{D1E53C04-8DCB-4BE0-B276-15EB1377CDC8}"/>
+              </a:ext>
+            </a:extLst>
+          </p:cNvPr>
+          <p:cNvSpPr>
+            <a:spLocks noGrp="1"/>
+          </p:cNvSpPr>
+          <p:nvPr>
+            <p:ph type="title"/>
+          </p:nvPr>
+        </p:nvSpPr>
+        <p:spPr/>
+        <p:txBody>
+          <a:bodyPr/>
+          <a:lstStyle/>
+          <a:p>
+            <a:endParaRPr lang="en-US"/>
+          </a:p>
+        </p:txBody>
+      </p:sp>
+      <p:sp>
+        <p:nvSpPr>
+          <p:cNvPr id="3" name="Content Placeholder 2">
+            <a:extLst>
+              <a:ext uri="{FF2B5EF4-FFF2-40B4-BE49-F238E27FC236}">
+                <a16:creationId xmlns:a16="http://schemas.microsoft.com/office/drawing/2014/main" id="{ACE250FA-37D5-4B4A-94F6-CE67A52E842F}"/>
+              </a:ext>
+            </a:extLst>
+          </p:cNvPr>
+          <p:cNvSpPr>
+            <a:spLocks noGrp="1"/>
+          </p:cNvSpPr>
+          <p:nvPr>
+            <p:ph idx="1"/>
+          </p:nvPr>
+        </p:nvSpPr>
+        <p:spPr/>
+        <p:txBody>
+          <a:bodyPr/>
+          <a:lstStyle/>
+          <a:p>
+            <a:endParaRPr lang="en-US"/>
+          </a:p>
+        </p:txBody>
+      </p:sp>
+      <p:pic>
+        <p:nvPicPr>
+          <p:cNvPr id="4" name="Picture 3">
+            <a:extLst>
+              <a:ext uri="{FF2B5EF4-FFF2-40B4-BE49-F238E27FC236}">
+                <a16:creationId xmlns:a16="http://schemas.microsoft.com/office/drawing/2014/main" id="{77D6253B-6E90-450B-90BC-55DCCC63A256}"/>
+              </a:ext>
+            </a:extLst>
+          </p:cNvPr>
+          <p:cNvPicPr>
+            <a:picLocks noChangeAspect="1"/>
+          </p:cNvPicPr>
+          <p:nvPr/>
+        </p:nvPicPr>
+        <p:blipFill>
+          <a:blip r:embed="rId2"/>
+          <a:stretch>
+            <a:fillRect/>
+          </a:stretch>
+        </p:blipFill>
+        <p:spPr>
+          <a:xfrm>
+            <a:off x="0" y="0"/>
+            <a:ext cx="12192000" cy="6858001"/>
+          </a:xfrm>
+          <a:prstGeom prst="rect">
+            <a:avLst/>
+          </a:prstGeom>
+        </p:spPr>
+      </p:pic>
+    </p:spTree>
+    <p:extLst>
+      <p:ext uri="{BB962C8B-B14F-4D97-AF65-F5344CB8AC3E}">
+        <p14:creationId xmlns:p14="http://schemas.microsoft.com/office/powerpoint/2010/main" val="1158214780"/>
+      </p:ext>
+    </p:extLst>
+  </p:cSld>
+  <p:clrMapOvr>
+    <a:masterClrMapping/>
+  </p:clrMapOvr>
+</p:sld>
+</file>
+
+<file path=ppt/slides/slide26.xml><?xml version="1.0" encoding="utf-8"?>
+<p:sld xmlns:a="http://schemas.openxmlformats.org/drawingml/2006/main" xmlns:r="http://schemas.openxmlformats.org/officeDocument/2006/relationships" xmlns:p="http://schemas.openxmlformats.org/presentationml/2006/main">
+  <p:cSld>
+    <p:spTree>
+      <p:nvGrpSpPr>
+        <p:cNvPr id="1" name=""/>
+        <p:cNvGrpSpPr/>
+        <p:nvPr/>
+      </p:nvGrpSpPr>
+      <p:grpSpPr>
+        <a:xfrm>
+          <a:off x="0" y="0"/>
+          <a:ext cx="0" cy="0"/>
+          <a:chOff x="0" y="0"/>
+          <a:chExt cx="0" cy="0"/>
+        </a:xfrm>
+      </p:grpSpPr>
+      <p:sp>
+        <p:nvSpPr>
+          <p:cNvPr id="2" name="Title 1">
+            <a:extLst>
+              <a:ext uri="{FF2B5EF4-FFF2-40B4-BE49-F238E27FC236}">
+                <a16:creationId xmlns:a16="http://schemas.microsoft.com/office/drawing/2014/main" id="{E786142F-D270-461D-841E-42430E2DE413}"/>
+              </a:ext>
+            </a:extLst>
+          </p:cNvPr>
+          <p:cNvSpPr>
+            <a:spLocks noGrp="1"/>
+          </p:cNvSpPr>
+          <p:nvPr>
+            <p:ph type="title"/>
+          </p:nvPr>
+        </p:nvSpPr>
+        <p:spPr/>
+        <p:txBody>
+          <a:bodyPr/>
+          <a:lstStyle/>
+          <a:p>
+            <a:endParaRPr lang="en-US"/>
+          </a:p>
+        </p:txBody>
+      </p:sp>
+      <p:sp>
+        <p:nvSpPr>
+          <p:cNvPr id="3" name="Content Placeholder 2">
+            <a:extLst>
+              <a:ext uri="{FF2B5EF4-FFF2-40B4-BE49-F238E27FC236}">
+                <a16:creationId xmlns:a16="http://schemas.microsoft.com/office/drawing/2014/main" id="{22B6E26F-9AB2-4D3E-82B5-130018AF27C8}"/>
+              </a:ext>
+            </a:extLst>
+          </p:cNvPr>
+          <p:cNvSpPr>
+            <a:spLocks noGrp="1"/>
+          </p:cNvSpPr>
+          <p:nvPr>
+            <p:ph idx="1"/>
+          </p:nvPr>
+        </p:nvSpPr>
+        <p:spPr/>
+        <p:txBody>
+          <a:bodyPr/>
+          <a:lstStyle/>
+          <a:p>
+            <a:endParaRPr lang="en-US"/>
+          </a:p>
+        </p:txBody>
+      </p:sp>
+      <p:pic>
+        <p:nvPicPr>
+          <p:cNvPr id="4" name="Picture 3">
+            <a:extLst>
+              <a:ext uri="{FF2B5EF4-FFF2-40B4-BE49-F238E27FC236}">
+                <a16:creationId xmlns:a16="http://schemas.microsoft.com/office/drawing/2014/main" id="{BDEE0145-AE89-4699-BEC3-4FE90382F54A}"/>
+              </a:ext>
+            </a:extLst>
+          </p:cNvPr>
+          <p:cNvPicPr>
+            <a:picLocks noChangeAspect="1"/>
+          </p:cNvPicPr>
+          <p:nvPr/>
+        </p:nvPicPr>
+        <p:blipFill>
+          <a:blip r:embed="rId2"/>
+          <a:stretch>
+            <a:fillRect/>
+          </a:stretch>
+        </p:blipFill>
+        <p:spPr>
+          <a:xfrm>
+            <a:off x="0" y="0"/>
+            <a:ext cx="12192000" cy="6858001"/>
+          </a:xfrm>
+          <a:prstGeom prst="rect">
+            <a:avLst/>
+          </a:prstGeom>
+        </p:spPr>
+      </p:pic>
+    </p:spTree>
+    <p:extLst>
+      <p:ext uri="{BB962C8B-B14F-4D97-AF65-F5344CB8AC3E}">
+        <p14:creationId xmlns:p14="http://schemas.microsoft.com/office/powerpoint/2010/main" val="1793873869"/>
+      </p:ext>
+    </p:extLst>
+  </p:cSld>
+  <p:clrMapOvr>
+    <a:masterClrMapping/>
+  </p:clrMapOvr>
+</p:sld>
+</file>
+
+<file path=ppt/slides/slide27.xml><?xml version="1.0" encoding="utf-8"?>
+<p:sld xmlns:a="http://schemas.openxmlformats.org/drawingml/2006/main" xmlns:r="http://schemas.openxmlformats.org/officeDocument/2006/relationships" xmlns:p="http://schemas.openxmlformats.org/presentationml/2006/main">
+  <p:cSld>
+    <p:spTree>
+      <p:nvGrpSpPr>
+        <p:cNvPr id="1" name=""/>
+        <p:cNvGrpSpPr/>
+        <p:nvPr/>
+      </p:nvGrpSpPr>
+      <p:grpSpPr>
+        <a:xfrm>
+          <a:off x="0" y="0"/>
+          <a:ext cx="0" cy="0"/>
+          <a:chOff x="0" y="0"/>
+          <a:chExt cx="0" cy="0"/>
+        </a:xfrm>
+      </p:grpSpPr>
+      <p:sp>
+        <p:nvSpPr>
+          <p:cNvPr id="2" name="Title 1">
+            <a:extLst>
+              <a:ext uri="{FF2B5EF4-FFF2-40B4-BE49-F238E27FC236}">
+                <a16:creationId xmlns:a16="http://schemas.microsoft.com/office/drawing/2014/main" id="{98014D2B-7BC7-4AD4-9DFA-0D0E9B7BD91E}"/>
+              </a:ext>
+            </a:extLst>
+          </p:cNvPr>
+          <p:cNvSpPr>
+            <a:spLocks noGrp="1"/>
+          </p:cNvSpPr>
+          <p:nvPr>
+            <p:ph type="title"/>
+          </p:nvPr>
+        </p:nvSpPr>
+        <p:spPr/>
+        <p:txBody>
+          <a:bodyPr/>
+          <a:lstStyle/>
+          <a:p>
+            <a:endParaRPr lang="en-US"/>
+          </a:p>
+        </p:txBody>
+      </p:sp>
+      <p:sp>
+        <p:nvSpPr>
+          <p:cNvPr id="3" name="Content Placeholder 2">
+            <a:extLst>
+              <a:ext uri="{FF2B5EF4-FFF2-40B4-BE49-F238E27FC236}">
+                <a16:creationId xmlns:a16="http://schemas.microsoft.com/office/drawing/2014/main" id="{CD88871E-ABBC-4189-8E31-BD6837B4A558}"/>
+              </a:ext>
+            </a:extLst>
+          </p:cNvPr>
+          <p:cNvSpPr>
+            <a:spLocks noGrp="1"/>
+          </p:cNvSpPr>
+          <p:nvPr>
+            <p:ph idx="1"/>
+          </p:nvPr>
+        </p:nvSpPr>
+        <p:spPr/>
+        <p:txBody>
+          <a:bodyPr/>
+          <a:lstStyle/>
+          <a:p>
+            <a:endParaRPr lang="en-US"/>
+          </a:p>
+        </p:txBody>
+      </p:sp>
+      <p:pic>
+        <p:nvPicPr>
+          <p:cNvPr id="4" name="Picture 3">
+            <a:extLst>
+              <a:ext uri="{FF2B5EF4-FFF2-40B4-BE49-F238E27FC236}">
+                <a16:creationId xmlns:a16="http://schemas.microsoft.com/office/drawing/2014/main" id="{E55DB9F9-70B5-46C0-90D4-AA20D3EB364D}"/>
+              </a:ext>
+            </a:extLst>
+          </p:cNvPr>
+          <p:cNvPicPr>
+            <a:picLocks noChangeAspect="1"/>
+          </p:cNvPicPr>
+          <p:nvPr/>
+        </p:nvPicPr>
+        <p:blipFill>
+          <a:blip r:embed="rId2"/>
+          <a:stretch>
+            <a:fillRect/>
+          </a:stretch>
+        </p:blipFill>
+        <p:spPr>
+          <a:xfrm>
+            <a:off x="0" y="0"/>
+            <a:ext cx="12192000" cy="6858001"/>
+          </a:xfrm>
+          <a:prstGeom prst="rect">
+            <a:avLst/>
+          </a:prstGeom>
+        </p:spPr>
+      </p:pic>
+    </p:spTree>
+    <p:extLst>
+      <p:ext uri="{BB962C8B-B14F-4D97-AF65-F5344CB8AC3E}">
+        <p14:creationId xmlns:p14="http://schemas.microsoft.com/office/powerpoint/2010/main" val="1810341640"/>
+      </p:ext>
+    </p:extLst>
+  </p:cSld>
+  <p:clrMapOvr>
+    <a:masterClrMapping/>
+  </p:clrMapOvr>
+</p:sld>
+</file>
+
+<file path=ppt/slides/slide28.xml><?xml version="1.0" encoding="utf-8"?>
+<p:sld xmlns:a="http://schemas.openxmlformats.org/drawingml/2006/main" xmlns:r="http://schemas.openxmlformats.org/officeDocument/2006/relationships" xmlns:p="http://schemas.openxmlformats.org/presentationml/2006/main">
+  <p:cSld>
+    <p:spTree>
+      <p:nvGrpSpPr>
+        <p:cNvPr id="1" name=""/>
+        <p:cNvGrpSpPr/>
+        <p:nvPr/>
+      </p:nvGrpSpPr>
+      <p:grpSpPr>
+        <a:xfrm>
+          <a:off x="0" y="0"/>
+          <a:ext cx="0" cy="0"/>
+          <a:chOff x="0" y="0"/>
+          <a:chExt cx="0" cy="0"/>
+        </a:xfrm>
+      </p:grpSpPr>
+      <p:sp>
+        <p:nvSpPr>
+          <p:cNvPr id="2" name="Title 1">
+            <a:extLst>
+              <a:ext uri="{FF2B5EF4-FFF2-40B4-BE49-F238E27FC236}">
+                <a16:creationId xmlns:a16="http://schemas.microsoft.com/office/drawing/2014/main" id="{71CB4010-2584-400A-BC01-280AF0F19CAC}"/>
+              </a:ext>
+            </a:extLst>
+          </p:cNvPr>
+          <p:cNvSpPr>
+            <a:spLocks noGrp="1"/>
+          </p:cNvSpPr>
+          <p:nvPr>
+            <p:ph type="title"/>
+          </p:nvPr>
+        </p:nvSpPr>
+        <p:spPr/>
+        <p:txBody>
+          <a:bodyPr/>
+          <a:lstStyle/>
+          <a:p>
+            <a:endParaRPr lang="en-US"/>
+          </a:p>
+        </p:txBody>
+      </p:sp>
+      <p:sp>
+        <p:nvSpPr>
+          <p:cNvPr id="3" name="Content Placeholder 2">
+            <a:extLst>
+              <a:ext uri="{FF2B5EF4-FFF2-40B4-BE49-F238E27FC236}">
+                <a16:creationId xmlns:a16="http://schemas.microsoft.com/office/drawing/2014/main" id="{150AB4E0-9406-440B-9B7D-183BAAF9C5BF}"/>
+              </a:ext>
+            </a:extLst>
+          </p:cNvPr>
+          <p:cNvSpPr>
+            <a:spLocks noGrp="1"/>
+          </p:cNvSpPr>
+          <p:nvPr>
+            <p:ph idx="1"/>
+          </p:nvPr>
+        </p:nvSpPr>
+        <p:spPr/>
+        <p:txBody>
+          <a:bodyPr/>
+          <a:lstStyle/>
+          <a:p>
+            <a:endParaRPr lang="en-US"/>
+          </a:p>
+        </p:txBody>
+      </p:sp>
+      <p:pic>
+        <p:nvPicPr>
+          <p:cNvPr id="4" name="Picture 3">
+            <a:extLst>
+              <a:ext uri="{FF2B5EF4-FFF2-40B4-BE49-F238E27FC236}">
+                <a16:creationId xmlns:a16="http://schemas.microsoft.com/office/drawing/2014/main" id="{1DDC5758-B90C-4BDE-B553-DD049EB5A408}"/>
+              </a:ext>
+            </a:extLst>
+          </p:cNvPr>
+          <p:cNvPicPr>
+            <a:picLocks noChangeAspect="1"/>
+          </p:cNvPicPr>
+          <p:nvPr/>
+        </p:nvPicPr>
+        <p:blipFill>
+          <a:blip r:embed="rId2"/>
+          <a:stretch>
+            <a:fillRect/>
+          </a:stretch>
+        </p:blipFill>
+        <p:spPr>
+          <a:xfrm>
+            <a:off x="0" y="0"/>
+            <a:ext cx="12192000" cy="6858001"/>
+          </a:xfrm>
+          <a:prstGeom prst="rect">
+            <a:avLst/>
+          </a:prstGeom>
+        </p:spPr>
+      </p:pic>
+    </p:spTree>
+    <p:extLst>
+      <p:ext uri="{BB962C8B-B14F-4D97-AF65-F5344CB8AC3E}">
+        <p14:creationId xmlns:p14="http://schemas.microsoft.com/office/powerpoint/2010/main" val="1135897037"/>
+      </p:ext>
+    </p:extLst>
+  </p:cSld>
+  <p:clrMapOvr>
+    <a:masterClrMapping/>
+  </p:clrMapOvr>
+</p:sld>
+</file>
+
+<file path=ppt/slides/slide29.xml><?xml version="1.0" encoding="utf-8"?>
+<p:sld xmlns:a="http://schemas.openxmlformats.org/drawingml/2006/main" xmlns:r="http://schemas.openxmlformats.org/officeDocument/2006/relationships" xmlns:p="http://schemas.openxmlformats.org/presentationml/2006/main">
+  <p:cSld>
+    <p:spTree>
+      <p:nvGrpSpPr>
+        <p:cNvPr id="1" name=""/>
+        <p:cNvGrpSpPr/>
+        <p:nvPr/>
+      </p:nvGrpSpPr>
+      <p:grpSpPr>
+        <a:xfrm>
+          <a:off x="0" y="0"/>
+          <a:ext cx="0" cy="0"/>
+          <a:chOff x="0" y="0"/>
+          <a:chExt cx="0" cy="0"/>
+        </a:xfrm>
+      </p:grpSpPr>
+      <p:sp>
+        <p:nvSpPr>
+          <p:cNvPr id="2" name="Title 1">
+            <a:extLst>
+              <a:ext uri="{FF2B5EF4-FFF2-40B4-BE49-F238E27FC236}">
+                <a16:creationId xmlns:a16="http://schemas.microsoft.com/office/drawing/2014/main" id="{C3C82E55-D302-4182-86CB-8F8E74694C44}"/>
+              </a:ext>
+            </a:extLst>
+          </p:cNvPr>
+          <p:cNvSpPr>
+            <a:spLocks noGrp="1"/>
+          </p:cNvSpPr>
+          <p:nvPr>
+            <p:ph type="title"/>
+          </p:nvPr>
+        </p:nvSpPr>
+        <p:spPr/>
+        <p:txBody>
+          <a:bodyPr/>
+          <a:lstStyle/>
+          <a:p>
+            <a:endParaRPr lang="en-US"/>
+          </a:p>
+        </p:txBody>
+      </p:sp>
+      <p:sp>
+        <p:nvSpPr>
+          <p:cNvPr id="3" name="Content Placeholder 2">
+            <a:extLst>
+              <a:ext uri="{FF2B5EF4-FFF2-40B4-BE49-F238E27FC236}">
+                <a16:creationId xmlns:a16="http://schemas.microsoft.com/office/drawing/2014/main" id="{E30171F6-32B8-40F2-A6C3-E0090FCBADEF}"/>
+              </a:ext>
+            </a:extLst>
+          </p:cNvPr>
+          <p:cNvSpPr>
+            <a:spLocks noGrp="1"/>
+          </p:cNvSpPr>
+          <p:nvPr>
+            <p:ph idx="1"/>
+          </p:nvPr>
+        </p:nvSpPr>
+        <p:spPr/>
+        <p:txBody>
+          <a:bodyPr/>
+          <a:lstStyle/>
+          <a:p>
+            <a:endParaRPr lang="en-US"/>
+          </a:p>
+        </p:txBody>
+      </p:sp>
+    </p:spTree>
+    <p:extLst>
+      <p:ext uri="{BB962C8B-B14F-4D97-AF65-F5344CB8AC3E}">
+        <p14:creationId xmlns:p14="http://schemas.microsoft.com/office/powerpoint/2010/main" val="3606911733"/>
       </p:ext>
     </p:extLst>
   </p:cSld>
@@ -4804,6 +5782,166 @@
     <p:extLst>
       <p:ext uri="{BB962C8B-B14F-4D97-AF65-F5344CB8AC3E}">
         <p14:creationId xmlns:p14="http://schemas.microsoft.com/office/powerpoint/2010/main" val="2354182978"/>
+      </p:ext>
+    </p:extLst>
+  </p:cSld>
+  <p:clrMapOvr>
+    <a:masterClrMapping/>
+  </p:clrMapOvr>
+</p:sld>
+</file>
+
+<file path=ppt/slides/slide30.xml><?xml version="1.0" encoding="utf-8"?>
+<p:sld xmlns:a="http://schemas.openxmlformats.org/drawingml/2006/main" xmlns:r="http://schemas.openxmlformats.org/officeDocument/2006/relationships" xmlns:p="http://schemas.openxmlformats.org/presentationml/2006/main">
+  <p:cSld>
+    <p:spTree>
+      <p:nvGrpSpPr>
+        <p:cNvPr id="1" name=""/>
+        <p:cNvGrpSpPr/>
+        <p:nvPr/>
+      </p:nvGrpSpPr>
+      <p:grpSpPr>
+        <a:xfrm>
+          <a:off x="0" y="0"/>
+          <a:ext cx="0" cy="0"/>
+          <a:chOff x="0" y="0"/>
+          <a:chExt cx="0" cy="0"/>
+        </a:xfrm>
+      </p:grpSpPr>
+      <p:sp>
+        <p:nvSpPr>
+          <p:cNvPr id="2" name="Title 1">
+            <a:extLst>
+              <a:ext uri="{FF2B5EF4-FFF2-40B4-BE49-F238E27FC236}">
+                <a16:creationId xmlns:a16="http://schemas.microsoft.com/office/drawing/2014/main" id="{F7857F05-5589-4A1C-91FF-8A3A710435E8}"/>
+              </a:ext>
+            </a:extLst>
+          </p:cNvPr>
+          <p:cNvSpPr>
+            <a:spLocks noGrp="1"/>
+          </p:cNvSpPr>
+          <p:nvPr>
+            <p:ph type="title"/>
+          </p:nvPr>
+        </p:nvSpPr>
+        <p:spPr/>
+        <p:txBody>
+          <a:bodyPr/>
+          <a:lstStyle/>
+          <a:p>
+            <a:endParaRPr lang="en-US"/>
+          </a:p>
+        </p:txBody>
+      </p:sp>
+      <p:sp>
+        <p:nvSpPr>
+          <p:cNvPr id="3" name="Content Placeholder 2">
+            <a:extLst>
+              <a:ext uri="{FF2B5EF4-FFF2-40B4-BE49-F238E27FC236}">
+                <a16:creationId xmlns:a16="http://schemas.microsoft.com/office/drawing/2014/main" id="{77BFA5DC-1DE2-4CF7-B4D4-9102820A6EBA}"/>
+              </a:ext>
+            </a:extLst>
+          </p:cNvPr>
+          <p:cNvSpPr>
+            <a:spLocks noGrp="1"/>
+          </p:cNvSpPr>
+          <p:nvPr>
+            <p:ph idx="1"/>
+          </p:nvPr>
+        </p:nvSpPr>
+        <p:spPr/>
+        <p:txBody>
+          <a:bodyPr/>
+          <a:lstStyle/>
+          <a:p>
+            <a:endParaRPr lang="en-US"/>
+          </a:p>
+        </p:txBody>
+      </p:sp>
+    </p:spTree>
+    <p:extLst>
+      <p:ext uri="{BB962C8B-B14F-4D97-AF65-F5344CB8AC3E}">
+        <p14:creationId xmlns:p14="http://schemas.microsoft.com/office/powerpoint/2010/main" val="3212916362"/>
+      </p:ext>
+    </p:extLst>
+  </p:cSld>
+  <p:clrMapOvr>
+    <a:masterClrMapping/>
+  </p:clrMapOvr>
+</p:sld>
+</file>
+
+<file path=ppt/slides/slide31.xml><?xml version="1.0" encoding="utf-8"?>
+<p:sld xmlns:a="http://schemas.openxmlformats.org/drawingml/2006/main" xmlns:r="http://schemas.openxmlformats.org/officeDocument/2006/relationships" xmlns:p="http://schemas.openxmlformats.org/presentationml/2006/main">
+  <p:cSld>
+    <p:spTree>
+      <p:nvGrpSpPr>
+        <p:cNvPr id="1" name=""/>
+        <p:cNvGrpSpPr/>
+        <p:nvPr/>
+      </p:nvGrpSpPr>
+      <p:grpSpPr>
+        <a:xfrm>
+          <a:off x="0" y="0"/>
+          <a:ext cx="0" cy="0"/>
+          <a:chOff x="0" y="0"/>
+          <a:chExt cx="0" cy="0"/>
+        </a:xfrm>
+      </p:grpSpPr>
+      <p:sp>
+        <p:nvSpPr>
+          <p:cNvPr id="2" name="Title 1">
+            <a:extLst>
+              <a:ext uri="{FF2B5EF4-FFF2-40B4-BE49-F238E27FC236}">
+                <a16:creationId xmlns:a16="http://schemas.microsoft.com/office/drawing/2014/main" id="{0B8DD263-8001-4A83-8B3D-D4B5A3AB6C6B}"/>
+              </a:ext>
+            </a:extLst>
+          </p:cNvPr>
+          <p:cNvSpPr>
+            <a:spLocks noGrp="1"/>
+          </p:cNvSpPr>
+          <p:nvPr>
+            <p:ph type="title"/>
+          </p:nvPr>
+        </p:nvSpPr>
+        <p:spPr/>
+        <p:txBody>
+          <a:bodyPr/>
+          <a:lstStyle/>
+          <a:p>
+            <a:endParaRPr lang="en-US"/>
+          </a:p>
+        </p:txBody>
+      </p:sp>
+      <p:sp>
+        <p:nvSpPr>
+          <p:cNvPr id="3" name="Content Placeholder 2">
+            <a:extLst>
+              <a:ext uri="{FF2B5EF4-FFF2-40B4-BE49-F238E27FC236}">
+                <a16:creationId xmlns:a16="http://schemas.microsoft.com/office/drawing/2014/main" id="{8CC36162-7225-4933-A269-ABC97CAD1A66}"/>
+              </a:ext>
+            </a:extLst>
+          </p:cNvPr>
+          <p:cNvSpPr>
+            <a:spLocks noGrp="1"/>
+          </p:cNvSpPr>
+          <p:nvPr>
+            <p:ph idx="1"/>
+          </p:nvPr>
+        </p:nvSpPr>
+        <p:spPr/>
+        <p:txBody>
+          <a:bodyPr/>
+          <a:lstStyle/>
+          <a:p>
+            <a:endParaRPr lang="en-US"/>
+          </a:p>
+        </p:txBody>
+      </p:sp>
+    </p:spTree>
+    <p:extLst>
+      <p:ext uri="{BB962C8B-B14F-4D97-AF65-F5344CB8AC3E}">
+        <p14:creationId xmlns:p14="http://schemas.microsoft.com/office/powerpoint/2010/main" val="1963186125"/>
       </p:ext>
     </p:extLst>
   </p:cSld>

</xml_diff>